<commit_message>
Modifications to presentation material
</commit_message>
<xml_diff>
--- a/worksheet.pptx
+++ b/worksheet.pptx
@@ -244,7 +244,7 @@
           <a:p>
             <a:fld id="{B8377C4A-47F3-8449-A624-EB7932C6F8DF}" type="datetimeFigureOut">
               <a:rPr lang="en-US" smtClean="0"/>
-              <a:t>2/7/19</a:t>
+              <a:t>2/8/19</a:t>
             </a:fld>
             <a:endParaRPr lang="en-US"/>
           </a:p>
@@ -414,7 +414,7 @@
           <a:p>
             <a:fld id="{B8377C4A-47F3-8449-A624-EB7932C6F8DF}" type="datetimeFigureOut">
               <a:rPr lang="en-US" smtClean="0"/>
-              <a:t>2/7/19</a:t>
+              <a:t>2/8/19</a:t>
             </a:fld>
             <a:endParaRPr lang="en-US"/>
           </a:p>
@@ -594,7 +594,7 @@
           <a:p>
             <a:fld id="{B8377C4A-47F3-8449-A624-EB7932C6F8DF}" type="datetimeFigureOut">
               <a:rPr lang="en-US" smtClean="0"/>
-              <a:t>2/7/19</a:t>
+              <a:t>2/8/19</a:t>
             </a:fld>
             <a:endParaRPr lang="en-US"/>
           </a:p>
@@ -764,7 +764,7 @@
           <a:p>
             <a:fld id="{B8377C4A-47F3-8449-A624-EB7932C6F8DF}" type="datetimeFigureOut">
               <a:rPr lang="en-US" smtClean="0"/>
-              <a:t>2/7/19</a:t>
+              <a:t>2/8/19</a:t>
             </a:fld>
             <a:endParaRPr lang="en-US"/>
           </a:p>
@@ -1008,7 +1008,7 @@
           <a:p>
             <a:fld id="{B8377C4A-47F3-8449-A624-EB7932C6F8DF}" type="datetimeFigureOut">
               <a:rPr lang="en-US" smtClean="0"/>
-              <a:t>2/7/19</a:t>
+              <a:t>2/8/19</a:t>
             </a:fld>
             <a:endParaRPr lang="en-US"/>
           </a:p>
@@ -1240,7 +1240,7 @@
           <a:p>
             <a:fld id="{B8377C4A-47F3-8449-A624-EB7932C6F8DF}" type="datetimeFigureOut">
               <a:rPr lang="en-US" smtClean="0"/>
-              <a:t>2/7/19</a:t>
+              <a:t>2/8/19</a:t>
             </a:fld>
             <a:endParaRPr lang="en-US"/>
           </a:p>
@@ -1607,7 +1607,7 @@
           <a:p>
             <a:fld id="{B8377C4A-47F3-8449-A624-EB7932C6F8DF}" type="datetimeFigureOut">
               <a:rPr lang="en-US" smtClean="0"/>
-              <a:t>2/7/19</a:t>
+              <a:t>2/8/19</a:t>
             </a:fld>
             <a:endParaRPr lang="en-US"/>
           </a:p>
@@ -1725,7 +1725,7 @@
           <a:p>
             <a:fld id="{B8377C4A-47F3-8449-A624-EB7932C6F8DF}" type="datetimeFigureOut">
               <a:rPr lang="en-US" smtClean="0"/>
-              <a:t>2/7/19</a:t>
+              <a:t>2/8/19</a:t>
             </a:fld>
             <a:endParaRPr lang="en-US"/>
           </a:p>
@@ -1820,7 +1820,7 @@
           <a:p>
             <a:fld id="{B8377C4A-47F3-8449-A624-EB7932C6F8DF}" type="datetimeFigureOut">
               <a:rPr lang="en-US" smtClean="0"/>
-              <a:t>2/7/19</a:t>
+              <a:t>2/8/19</a:t>
             </a:fld>
             <a:endParaRPr lang="en-US"/>
           </a:p>
@@ -2097,7 +2097,7 @@
           <a:p>
             <a:fld id="{B8377C4A-47F3-8449-A624-EB7932C6F8DF}" type="datetimeFigureOut">
               <a:rPr lang="en-US" smtClean="0"/>
-              <a:t>2/7/19</a:t>
+              <a:t>2/8/19</a:t>
             </a:fld>
             <a:endParaRPr lang="en-US"/>
           </a:p>
@@ -2354,7 +2354,7 @@
           <a:p>
             <a:fld id="{B8377C4A-47F3-8449-A624-EB7932C6F8DF}" type="datetimeFigureOut">
               <a:rPr lang="en-US" smtClean="0"/>
-              <a:t>2/7/19</a:t>
+              <a:t>2/8/19</a:t>
             </a:fld>
             <a:endParaRPr lang="en-US"/>
           </a:p>
@@ -2567,7 +2567,7 @@
           <a:p>
             <a:fld id="{B8377C4A-47F3-8449-A624-EB7932C6F8DF}" type="datetimeFigureOut">
               <a:rPr lang="en-US" smtClean="0"/>
-              <a:t>2/7/19</a:t>
+              <a:t>2/8/19</a:t>
             </a:fld>
             <a:endParaRPr lang="en-US"/>
           </a:p>
@@ -3205,7 +3205,7 @@
           <p:nvPr>
             <p:extLst>
               <p:ext uri="{D42A27DB-BD31-4B8C-83A1-F6EECF244321}">
-                <p14:modId xmlns:p14="http://schemas.microsoft.com/office/powerpoint/2010/main" val="731161476"/>
+                <p14:modId xmlns:p14="http://schemas.microsoft.com/office/powerpoint/2010/main" val="1286268983"/>
               </p:ext>
             </p:extLst>
           </p:nvPr>
@@ -5057,7 +5057,7 @@
           <p:nvPr>
             <p:extLst>
               <p:ext uri="{D42A27DB-BD31-4B8C-83A1-F6EECF244321}">
-                <p14:modId xmlns:p14="http://schemas.microsoft.com/office/powerpoint/2010/main" val="3104631395"/>
+                <p14:modId xmlns:p14="http://schemas.microsoft.com/office/powerpoint/2010/main" val="116118139"/>
               </p:ext>
             </p:extLst>
           </p:nvPr>
@@ -6500,7 +6500,7 @@
         </p:nvCxnSpPr>
         <p:spPr>
           <a:xfrm>
-            <a:off x="4117892" y="2170993"/>
+            <a:off x="4117892" y="2180420"/>
             <a:ext cx="1" cy="3585626"/>
           </a:xfrm>
           <a:prstGeom prst="line">
@@ -6765,13 +6765,18 @@
         </p:nvSpPr>
         <p:spPr>
           <a:xfrm>
-            <a:off x="2197111" y="276686"/>
-            <a:ext cx="5306076" cy="276999"/>
+            <a:off x="2839702" y="412369"/>
+            <a:ext cx="7035808" cy="646331"/>
           </a:xfrm>
           <a:prstGeom prst="rect">
             <a:avLst/>
           </a:prstGeom>
           <a:noFill/>
+          <a:ln>
+            <a:solidFill>
+              <a:schemeClr val="tx1"/>
+            </a:solidFill>
+          </a:ln>
         </p:spPr>
         <p:txBody>
           <a:bodyPr wrap="square" rtlCol="0">
@@ -6781,7 +6786,7 @@
           <a:p>
             <a:r>
               <a:rPr lang="en-US" sz="1200" dirty="0"/>
-              <a:t>Researcher file directory associated with images and spectra of spiral galaxies</a:t>
+              <a:t>Amanda’s Research Project - a graduate student is studying spiral galaxies and the supermassive black holes at the center of these galaxies.  She has images, spectra, some preliminary measurements and analysis, as well as some background information in this directory.  How can she make this directory easier to navigate?</a:t>
             </a:r>
           </a:p>
         </p:txBody>
@@ -11517,7 +11522,7 @@
         </p:nvCxnSpPr>
         <p:spPr>
           <a:xfrm>
-            <a:off x="3034057" y="6572156"/>
+            <a:off x="3020805" y="6572156"/>
             <a:ext cx="328880" cy="0"/>
           </a:xfrm>
           <a:prstGeom prst="straightConnector1">
@@ -11735,8 +11740,8 @@
         </p:nvCxnSpPr>
         <p:spPr>
           <a:xfrm>
-            <a:off x="3905151" y="5519720"/>
-            <a:ext cx="2490046" cy="0"/>
+            <a:off x="3944907" y="5519720"/>
+            <a:ext cx="2463542" cy="0"/>
           </a:xfrm>
           <a:prstGeom prst="straightConnector1">
             <a:avLst/>
@@ -11867,8 +11872,8 @@
         </p:nvCxnSpPr>
         <p:spPr>
           <a:xfrm>
-            <a:off x="6395197" y="5505117"/>
-            <a:ext cx="0" cy="2074270"/>
+            <a:off x="6395197" y="5519720"/>
+            <a:ext cx="0" cy="2059667"/>
           </a:xfrm>
           <a:prstGeom prst="line">
             <a:avLst/>

</xml_diff>